<commit_message>
Update Automatic Washing Machine Control System Using Verilog HDL.pptx
</commit_message>
<xml_diff>
--- a/Automatic Washing Machine Control System Using Verilog HDL.pptx
+++ b/Automatic Washing Machine Control System Using Verilog HDL.pptx
@@ -19,8 +19,9 @@
     <p:sldId id="267" r:id="rId13"/>
     <p:sldId id="268" r:id="rId14"/>
     <p:sldId id="270" r:id="rId15"/>
-    <p:sldId id="271" r:id="rId16"/>
-    <p:sldId id="269" r:id="rId17"/>
+    <p:sldId id="272" r:id="rId16"/>
+    <p:sldId id="271" r:id="rId17"/>
+    <p:sldId id="269" r:id="rId18"/>
   </p:sldIdLst>
   <p:sldSz cx="12192000" cy="6858000"/>
   <p:notesSz cx="12192000" cy="6858000"/>
@@ -277,7 +278,7 @@
           <a:p>
             <a:fld id="{1D8BD707-D9CF-40AE-B4C6-C98DA3205C09}" type="datetimeFigureOut">
               <a:rPr lang="en-US"/>
-              <a:t>6/6/2022</a:t>
+              <a:t>6/11/2022</a:t>
             </a:fld>
             <a:endParaRPr lang="en-US"/>
           </a:p>
@@ -454,7 +455,7 @@
           <a:p>
             <a:fld id="{1D8BD707-D9CF-40AE-B4C6-C98DA3205C09}" type="datetimeFigureOut">
               <a:rPr lang="en-US"/>
-              <a:t>6/6/2022</a:t>
+              <a:t>6/11/2022</a:t>
             </a:fld>
             <a:endParaRPr lang="en-US"/>
           </a:p>
@@ -668,7 +669,7 @@
           <a:p>
             <a:fld id="{1D8BD707-D9CF-40AE-B4C6-C98DA3205C09}" type="datetimeFigureOut">
               <a:rPr lang="en-US"/>
-              <a:t>6/6/2022</a:t>
+              <a:t>6/11/2022</a:t>
             </a:fld>
             <a:endParaRPr lang="en-US"/>
           </a:p>
@@ -816,7 +817,7 @@
           <a:p>
             <a:fld id="{1D8BD707-D9CF-40AE-B4C6-C98DA3205C09}" type="datetimeFigureOut">
               <a:rPr lang="en-US"/>
-              <a:t>6/6/2022</a:t>
+              <a:t>6/11/2022</a:t>
             </a:fld>
             <a:endParaRPr lang="en-US"/>
           </a:p>
@@ -935,7 +936,7 @@
           <a:p>
             <a:fld id="{1D8BD707-D9CF-40AE-B4C6-C98DA3205C09}" type="datetimeFigureOut">
               <a:rPr lang="en-US"/>
-              <a:t>6/6/2022</a:t>
+              <a:t>6/11/2022</a:t>
             </a:fld>
             <a:endParaRPr lang="en-US"/>
           </a:p>
@@ -1160,7 +1161,7 @@
           <a:p>
             <a:fld id="{1D8BD707-D9CF-40AE-B4C6-C98DA3205C09}" type="datetimeFigureOut">
               <a:rPr lang="en-US"/>
-              <a:t>6/6/2022</a:t>
+              <a:t>6/11/2022</a:t>
             </a:fld>
             <a:endParaRPr lang="en-US"/>
           </a:p>
@@ -7621,6 +7622,204 @@
       </p:grpSpPr>
       <p:pic>
         <p:nvPicPr>
+          <p:cNvPr id="5" name="Picture 4">
+            <a:extLst>
+              <a:ext uri="{FF2B5EF4-FFF2-40B4-BE49-F238E27FC236}">
+                <a16:creationId xmlns:a16="http://schemas.microsoft.com/office/drawing/2014/main" id="{4B9A9764-46E8-1531-1089-3F7B44879A6C}"/>
+              </a:ext>
+            </a:extLst>
+          </p:cNvPr>
+          <p:cNvPicPr>
+            <a:picLocks noChangeAspect="1"/>
+          </p:cNvPicPr>
+          <p:nvPr/>
+        </p:nvPicPr>
+        <p:blipFill>
+          <a:blip r:embed="rId2"/>
+          <a:stretch>
+            <a:fillRect/>
+          </a:stretch>
+        </p:blipFill>
+        <p:spPr>
+          <a:xfrm>
+            <a:off x="2438400" y="609600"/>
+            <a:ext cx="6797629" cy="396274"/>
+          </a:xfrm>
+          <a:prstGeom prst="rect">
+            <a:avLst/>
+          </a:prstGeom>
+        </p:spPr>
+      </p:pic>
+      <p:pic>
+        <p:nvPicPr>
+          <p:cNvPr id="7" name="Picture 6">
+            <a:extLst>
+              <a:ext uri="{FF2B5EF4-FFF2-40B4-BE49-F238E27FC236}">
+                <a16:creationId xmlns:a16="http://schemas.microsoft.com/office/drawing/2014/main" id="{E2CC585E-7578-3380-2FEB-B99E18C2537D}"/>
+              </a:ext>
+            </a:extLst>
+          </p:cNvPr>
+          <p:cNvPicPr>
+            <a:picLocks noChangeAspect="1"/>
+          </p:cNvPicPr>
+          <p:nvPr/>
+        </p:nvPicPr>
+        <p:blipFill>
+          <a:blip r:embed="rId3"/>
+          <a:stretch>
+            <a:fillRect/>
+          </a:stretch>
+        </p:blipFill>
+        <p:spPr>
+          <a:xfrm>
+            <a:off x="2125636" y="2590800"/>
+            <a:ext cx="7940728" cy="281964"/>
+          </a:xfrm>
+          <a:prstGeom prst="rect">
+            <a:avLst/>
+          </a:prstGeom>
+        </p:spPr>
+      </p:pic>
+      <p:cxnSp>
+        <p:nvCxnSpPr>
+          <p:cNvPr id="9" name="Straight Arrow Connector 8">
+            <a:extLst>
+              <a:ext uri="{FF2B5EF4-FFF2-40B4-BE49-F238E27FC236}">
+                <a16:creationId xmlns:a16="http://schemas.microsoft.com/office/drawing/2014/main" id="{21C29511-E5A4-F022-EBF9-4F6EBC51AA59}"/>
+              </a:ext>
+            </a:extLst>
+          </p:cNvPr>
+          <p:cNvCxnSpPr/>
+          <p:nvPr/>
+        </p:nvCxnSpPr>
+        <p:spPr>
+          <a:xfrm>
+            <a:off x="5715000" y="1295400"/>
+            <a:ext cx="0" cy="533400"/>
+          </a:xfrm>
+          <a:prstGeom prst="straightConnector1">
+            <a:avLst/>
+          </a:prstGeom>
+          <a:ln>
+            <a:tailEnd type="triangle"/>
+          </a:ln>
+        </p:spPr>
+        <p:style>
+          <a:lnRef idx="1">
+            <a:schemeClr val="dk1"/>
+          </a:lnRef>
+          <a:fillRef idx="0">
+            <a:schemeClr val="dk1"/>
+          </a:fillRef>
+          <a:effectRef idx="0">
+            <a:schemeClr val="dk1"/>
+          </a:effectRef>
+          <a:fontRef idx="minor">
+            <a:schemeClr val="tx1"/>
+          </a:fontRef>
+        </p:style>
+      </p:cxnSp>
+      <p:pic>
+        <p:nvPicPr>
+          <p:cNvPr id="11" name="Picture 10">
+            <a:extLst>
+              <a:ext uri="{FF2B5EF4-FFF2-40B4-BE49-F238E27FC236}">
+                <a16:creationId xmlns:a16="http://schemas.microsoft.com/office/drawing/2014/main" id="{DE4374CC-0AEF-4860-B08A-2867CAE5A401}"/>
+              </a:ext>
+            </a:extLst>
+          </p:cNvPr>
+          <p:cNvPicPr>
+            <a:picLocks noChangeAspect="1"/>
+          </p:cNvPicPr>
+          <p:nvPr/>
+        </p:nvPicPr>
+        <p:blipFill>
+          <a:blip r:embed="rId4"/>
+          <a:stretch>
+            <a:fillRect/>
+          </a:stretch>
+        </p:blipFill>
+        <p:spPr>
+          <a:xfrm>
+            <a:off x="4305461" y="4267200"/>
+            <a:ext cx="3063505" cy="1646063"/>
+          </a:xfrm>
+          <a:prstGeom prst="rect">
+            <a:avLst/>
+          </a:prstGeom>
+        </p:spPr>
+      </p:pic>
+      <p:cxnSp>
+        <p:nvCxnSpPr>
+          <p:cNvPr id="13" name="Straight Arrow Connector 12">
+            <a:extLst>
+              <a:ext uri="{FF2B5EF4-FFF2-40B4-BE49-F238E27FC236}">
+                <a16:creationId xmlns:a16="http://schemas.microsoft.com/office/drawing/2014/main" id="{E1886AEE-7419-90F2-795F-A279D8AA41BF}"/>
+              </a:ext>
+            </a:extLst>
+          </p:cNvPr>
+          <p:cNvCxnSpPr/>
+          <p:nvPr/>
+        </p:nvCxnSpPr>
+        <p:spPr>
+          <a:xfrm>
+            <a:off x="5715000" y="3124200"/>
+            <a:ext cx="0" cy="685800"/>
+          </a:xfrm>
+          <a:prstGeom prst="straightConnector1">
+            <a:avLst/>
+          </a:prstGeom>
+          <a:ln>
+            <a:tailEnd type="triangle"/>
+          </a:ln>
+        </p:spPr>
+        <p:style>
+          <a:lnRef idx="1">
+            <a:schemeClr val="dk1"/>
+          </a:lnRef>
+          <a:fillRef idx="0">
+            <a:schemeClr val="dk1"/>
+          </a:fillRef>
+          <a:effectRef idx="0">
+            <a:schemeClr val="dk1"/>
+          </a:effectRef>
+          <a:fontRef idx="minor">
+            <a:schemeClr val="tx1"/>
+          </a:fontRef>
+        </p:style>
+      </p:cxnSp>
+    </p:spTree>
+    <p:extLst>
+      <p:ext uri="{BB962C8B-B14F-4D97-AF65-F5344CB8AC3E}">
+        <p14:creationId xmlns:p14="http://schemas.microsoft.com/office/powerpoint/2010/main" val="4235335784"/>
+      </p:ext>
+    </p:extLst>
+  </p:cSld>
+  <p:clrMapOvr>
+    <a:masterClrMapping/>
+  </p:clrMapOvr>
+</p:sld>
+</file>
+
+<file path=ppt/slides/slide16.xml><?xml version="1.0" encoding="utf-8"?>
+<p:sld xmlns:a="http://schemas.openxmlformats.org/drawingml/2006/main" xmlns:r="http://schemas.openxmlformats.org/officeDocument/2006/relationships" xmlns:p="http://schemas.openxmlformats.org/presentationml/2006/main">
+  <p:cSld>
+    <p:spTree>
+      <p:nvGrpSpPr>
+        <p:cNvPr id="1" name=""/>
+        <p:cNvGrpSpPr/>
+        <p:nvPr/>
+      </p:nvGrpSpPr>
+      <p:grpSpPr>
+        <a:xfrm>
+          <a:off x="0" y="0"/>
+          <a:ext cx="0" cy="0"/>
+          <a:chOff x="0" y="0"/>
+          <a:chExt cx="0" cy="0"/>
+        </a:xfrm>
+      </p:grpSpPr>
+      <p:pic>
+        <p:nvPicPr>
           <p:cNvPr id="3" name="Picture 2">
             <a:extLst>
               <a:ext uri="{FF2B5EF4-FFF2-40B4-BE49-F238E27FC236}">
@@ -7662,7 +7861,7 @@
 </p:sld>
 </file>
 
-<file path=ppt/slides/slide16.xml><?xml version="1.0" encoding="utf-8"?>
+<file path=ppt/slides/slide17.xml><?xml version="1.0" encoding="utf-8"?>
 <p:sld xmlns:a="http://schemas.openxmlformats.org/drawingml/2006/main" xmlns:r="http://schemas.openxmlformats.org/officeDocument/2006/relationships" xmlns:p="http://schemas.openxmlformats.org/presentationml/2006/main" showMasterSp="0">
   <p:cSld>
     <p:spTree>

</xml_diff>